<commit_message>
[RM Ch04] Edit RM-ch-04-nod-profiles figure
Changed "Indeterminate" to "Non-predictable" as per @petorre
</commit_message>
<xml_diff>
--- a/doc/ref_model/figures/RM-ch04-node-profiles.pptx
+++ b/doc/ref_model/figures/RM-ch04-node-profiles.pptx
@@ -112,12 +112,20 @@
 </p:presentation>
 </file>
 
+<file path=ppt/revisionInfo.xml><?xml version="1.0" encoding="utf-8"?>
+<p1510:revInfo xmlns:a="http://schemas.openxmlformats.org/drawingml/2006/main" xmlns:r="http://schemas.openxmlformats.org/officeDocument/2006/relationships" xmlns:p1510="http://schemas.microsoft.com/office/powerpoint/2015/10/main">
+  <p1510:revLst>
+    <p1510:client id="{C7E8885B-AA19-482A-BBF8-5897B64D00B8}" v="1" dt="2021-05-25T21:46:31.114"/>
+  </p1510:revLst>
+</p1510:revInfo>
+</file>
+
 <file path=ppt/changesInfos/changesInfo1.xml><?xml version="1.0" encoding="utf-8"?>
 <pc:chgInfo xmlns:a="http://schemas.openxmlformats.org/drawingml/2006/main" xmlns:r="http://schemas.openxmlformats.org/officeDocument/2006/relationships" xmlns:ac="http://schemas.microsoft.com/office/drawing/2013/main/command" xmlns:pc="http://schemas.microsoft.com/office/powerpoint/2013/main/command">
   <pc:docChgLst>
     <pc:chgData name="GOYAL, PANKAJ" userId="89a7a907-3f17-47e2-a926-8cb9790a653b" providerId="ADAL" clId="{C7E8885B-AA19-482A-BBF8-5897B64D00B8}"/>
     <pc:docChg chg="delSld modSld">
-      <pc:chgData name="GOYAL, PANKAJ" userId="89a7a907-3f17-47e2-a926-8cb9790a653b" providerId="ADAL" clId="{C7E8885B-AA19-482A-BBF8-5897B64D00B8}" dt="2021-05-11T15:12:15.862" v="31" actId="122"/>
+      <pc:chgData name="GOYAL, PANKAJ" userId="89a7a907-3f17-47e2-a926-8cb9790a653b" providerId="ADAL" clId="{C7E8885B-AA19-482A-BBF8-5897B64D00B8}" dt="2021-05-25T21:46:31.114" v="32"/>
       <pc:docMkLst>
         <pc:docMk/>
       </pc:docMkLst>
@@ -136,13 +144,13 @@
         </pc:sldMkLst>
       </pc:sldChg>
       <pc:sldChg chg="modSp mod">
-        <pc:chgData name="GOYAL, PANKAJ" userId="89a7a907-3f17-47e2-a926-8cb9790a653b" providerId="ADAL" clId="{C7E8885B-AA19-482A-BBF8-5897B64D00B8}" dt="2021-05-11T15:12:15.862" v="31" actId="122"/>
+        <pc:chgData name="GOYAL, PANKAJ" userId="89a7a907-3f17-47e2-a926-8cb9790a653b" providerId="ADAL" clId="{C7E8885B-AA19-482A-BBF8-5897B64D00B8}" dt="2021-05-25T21:46:31.114" v="32"/>
         <pc:sldMkLst>
           <pc:docMk/>
           <pc:sldMk cId="32408640" sldId="283"/>
         </pc:sldMkLst>
         <pc:spChg chg="mod">
-          <ac:chgData name="GOYAL, PANKAJ" userId="89a7a907-3f17-47e2-a926-8cb9790a653b" providerId="ADAL" clId="{C7E8885B-AA19-482A-BBF8-5897B64D00B8}" dt="2021-05-11T15:12:15.862" v="31" actId="122"/>
+          <ac:chgData name="GOYAL, PANKAJ" userId="89a7a907-3f17-47e2-a926-8cb9790a653b" providerId="ADAL" clId="{C7E8885B-AA19-482A-BBF8-5897B64D00B8}" dt="2021-05-25T21:46:31.114" v="32"/>
           <ac:spMkLst>
             <pc:docMk/>
             <pc:sldMk cId="32408640" sldId="283"/>
@@ -150,7 +158,7 @@
           </ac:spMkLst>
         </pc:spChg>
         <pc:spChg chg="mod">
-          <ac:chgData name="GOYAL, PANKAJ" userId="89a7a907-3f17-47e2-a926-8cb9790a653b" providerId="ADAL" clId="{C7E8885B-AA19-482A-BBF8-5897B64D00B8}" dt="2021-05-11T15:12:10.070" v="30" actId="1076"/>
+          <ac:chgData name="GOYAL, PANKAJ" userId="89a7a907-3f17-47e2-a926-8cb9790a653b" providerId="ADAL" clId="{C7E8885B-AA19-482A-BBF8-5897B64D00B8}" dt="2021-05-25T21:46:31.114" v="32"/>
           <ac:spMkLst>
             <pc:docMk/>
             <pc:sldMk cId="32408640" sldId="283"/>
@@ -158,13 +166,141 @@
           </ac:spMkLst>
         </pc:spChg>
         <pc:spChg chg="mod">
-          <ac:chgData name="GOYAL, PANKAJ" userId="89a7a907-3f17-47e2-a926-8cb9790a653b" providerId="ADAL" clId="{C7E8885B-AA19-482A-BBF8-5897B64D00B8}" dt="2021-05-11T15:11:58.508" v="29" actId="14100"/>
+          <ac:chgData name="GOYAL, PANKAJ" userId="89a7a907-3f17-47e2-a926-8cb9790a653b" providerId="ADAL" clId="{C7E8885B-AA19-482A-BBF8-5897B64D00B8}" dt="2021-05-25T21:46:31.114" v="32"/>
+          <ac:spMkLst>
+            <pc:docMk/>
+            <pc:sldMk cId="32408640" sldId="283"/>
+            <ac:spMk id="31" creationId="{FD2C3734-47AD-4673-99E1-E77DB135832D}"/>
+          </ac:spMkLst>
+        </pc:spChg>
+        <pc:spChg chg="mod">
+          <ac:chgData name="GOYAL, PANKAJ" userId="89a7a907-3f17-47e2-a926-8cb9790a653b" providerId="ADAL" clId="{C7E8885B-AA19-482A-BBF8-5897B64D00B8}" dt="2021-05-25T21:46:31.114" v="32"/>
+          <ac:spMkLst>
+            <pc:docMk/>
+            <pc:sldMk cId="32408640" sldId="283"/>
+            <ac:spMk id="32" creationId="{E30EE8AD-1FF4-480E-89B4-CD134E8FC46A}"/>
+          </ac:spMkLst>
+        </pc:spChg>
+        <pc:spChg chg="mod">
+          <ac:chgData name="GOYAL, PANKAJ" userId="89a7a907-3f17-47e2-a926-8cb9790a653b" providerId="ADAL" clId="{C7E8885B-AA19-482A-BBF8-5897B64D00B8}" dt="2021-05-25T21:46:31.114" v="32"/>
+          <ac:spMkLst>
+            <pc:docMk/>
+            <pc:sldMk cId="32408640" sldId="283"/>
+            <ac:spMk id="33" creationId="{5F2D30D7-2F59-4DFE-B8A7-BEFCFC9C7F3A}"/>
+          </ac:spMkLst>
+        </pc:spChg>
+        <pc:spChg chg="mod">
+          <ac:chgData name="GOYAL, PANKAJ" userId="89a7a907-3f17-47e2-a926-8cb9790a653b" providerId="ADAL" clId="{C7E8885B-AA19-482A-BBF8-5897B64D00B8}" dt="2021-05-25T21:46:31.114" v="32"/>
+          <ac:spMkLst>
+            <pc:docMk/>
+            <pc:sldMk cId="32408640" sldId="283"/>
+            <ac:spMk id="36" creationId="{EA65F39C-50D7-4804-B56B-5C19A235F685}"/>
+          </ac:spMkLst>
+        </pc:spChg>
+        <pc:spChg chg="mod">
+          <ac:chgData name="GOYAL, PANKAJ" userId="89a7a907-3f17-47e2-a926-8cb9790a653b" providerId="ADAL" clId="{C7E8885B-AA19-482A-BBF8-5897B64D00B8}" dt="2021-05-25T21:46:31.114" v="32"/>
+          <ac:spMkLst>
+            <pc:docMk/>
+            <pc:sldMk cId="32408640" sldId="283"/>
+            <ac:spMk id="37" creationId="{52CA58C7-FF29-4E35-AEF8-BB8B6849A0B0}"/>
+          </ac:spMkLst>
+        </pc:spChg>
+        <pc:spChg chg="mod">
+          <ac:chgData name="GOYAL, PANKAJ" userId="89a7a907-3f17-47e2-a926-8cb9790a653b" providerId="ADAL" clId="{C7E8885B-AA19-482A-BBF8-5897B64D00B8}" dt="2021-05-25T21:46:31.114" v="32"/>
+          <ac:spMkLst>
+            <pc:docMk/>
+            <pc:sldMk cId="32408640" sldId="283"/>
+            <ac:spMk id="50" creationId="{3119CF2E-038D-4740-BF12-38AEFBE910BB}"/>
+          </ac:spMkLst>
+        </pc:spChg>
+        <pc:spChg chg="mod">
+          <ac:chgData name="GOYAL, PANKAJ" userId="89a7a907-3f17-47e2-a926-8cb9790a653b" providerId="ADAL" clId="{C7E8885B-AA19-482A-BBF8-5897B64D00B8}" dt="2021-05-25T21:46:31.114" v="32"/>
+          <ac:spMkLst>
+            <pc:docMk/>
+            <pc:sldMk cId="32408640" sldId="283"/>
+            <ac:spMk id="51" creationId="{8A04338A-BCB5-4747-98E1-1071A574E7F0}"/>
+          </ac:spMkLst>
+        </pc:spChg>
+        <pc:spChg chg="mod">
+          <ac:chgData name="GOYAL, PANKAJ" userId="89a7a907-3f17-47e2-a926-8cb9790a653b" providerId="ADAL" clId="{C7E8885B-AA19-482A-BBF8-5897B64D00B8}" dt="2021-05-25T21:46:31.114" v="32"/>
+          <ac:spMkLst>
+            <pc:docMk/>
+            <pc:sldMk cId="32408640" sldId="283"/>
+            <ac:spMk id="52" creationId="{59CC5D1D-E29C-4DF7-934E-52CDA993FFB7}"/>
+          </ac:spMkLst>
+        </pc:spChg>
+        <pc:spChg chg="mod">
+          <ac:chgData name="GOYAL, PANKAJ" userId="89a7a907-3f17-47e2-a926-8cb9790a653b" providerId="ADAL" clId="{C7E8885B-AA19-482A-BBF8-5897B64D00B8}" dt="2021-05-25T21:46:31.114" v="32"/>
+          <ac:spMkLst>
+            <pc:docMk/>
+            <pc:sldMk cId="32408640" sldId="283"/>
+            <ac:spMk id="66" creationId="{C79DA955-3DED-444E-95C6-D3E5BCB086A2}"/>
+          </ac:spMkLst>
+        </pc:spChg>
+        <pc:spChg chg="mod">
+          <ac:chgData name="GOYAL, PANKAJ" userId="89a7a907-3f17-47e2-a926-8cb9790a653b" providerId="ADAL" clId="{C7E8885B-AA19-482A-BBF8-5897B64D00B8}" dt="2021-05-25T21:46:31.114" v="32"/>
           <ac:spMkLst>
             <pc:docMk/>
             <pc:sldMk cId="32408640" sldId="283"/>
             <ac:spMk id="87" creationId="{00000000-0000-0000-0000-000000000000}"/>
           </ac:spMkLst>
         </pc:spChg>
+        <pc:grpChg chg="mod">
+          <ac:chgData name="GOYAL, PANKAJ" userId="89a7a907-3f17-47e2-a926-8cb9790a653b" providerId="ADAL" clId="{C7E8885B-AA19-482A-BBF8-5897B64D00B8}" dt="2021-05-25T21:46:31.114" v="32"/>
+          <ac:grpSpMkLst>
+            <pc:docMk/>
+            <pc:sldMk cId="32408640" sldId="283"/>
+            <ac:grpSpMk id="3" creationId="{B0D4D991-91B1-4741-976B-E864D1823D04}"/>
+          </ac:grpSpMkLst>
+        </pc:grpChg>
+        <pc:grpChg chg="mod">
+          <ac:chgData name="GOYAL, PANKAJ" userId="89a7a907-3f17-47e2-a926-8cb9790a653b" providerId="ADAL" clId="{C7E8885B-AA19-482A-BBF8-5897B64D00B8}" dt="2021-05-25T21:46:31.114" v="32"/>
+          <ac:grpSpMkLst>
+            <pc:docMk/>
+            <pc:sldMk cId="32408640" sldId="283"/>
+            <ac:grpSpMk id="4" creationId="{1D4A1ED1-8494-4D7B-B8DB-7BFCE595560F}"/>
+          </ac:grpSpMkLst>
+        </pc:grpChg>
+        <pc:grpChg chg="mod">
+          <ac:chgData name="GOYAL, PANKAJ" userId="89a7a907-3f17-47e2-a926-8cb9790a653b" providerId="ADAL" clId="{C7E8885B-AA19-482A-BBF8-5897B64D00B8}" dt="2021-05-25T21:46:31.114" v="32"/>
+          <ac:grpSpMkLst>
+            <pc:docMk/>
+            <pc:sldMk cId="32408640" sldId="283"/>
+            <ac:grpSpMk id="5" creationId="{97143BC7-5ADC-4C51-B270-0A841CDE352B}"/>
+          </ac:grpSpMkLst>
+        </pc:grpChg>
+        <pc:grpChg chg="mod">
+          <ac:chgData name="GOYAL, PANKAJ" userId="89a7a907-3f17-47e2-a926-8cb9790a653b" providerId="ADAL" clId="{C7E8885B-AA19-482A-BBF8-5897B64D00B8}" dt="2021-05-25T21:46:31.114" v="32"/>
+          <ac:grpSpMkLst>
+            <pc:docMk/>
+            <pc:sldMk cId="32408640" sldId="283"/>
+            <ac:grpSpMk id="6" creationId="{BA20805A-FF6B-4FA2-A982-1D38FED12E58}"/>
+          </ac:grpSpMkLst>
+        </pc:grpChg>
+        <pc:grpChg chg="mod">
+          <ac:chgData name="GOYAL, PANKAJ" userId="89a7a907-3f17-47e2-a926-8cb9790a653b" providerId="ADAL" clId="{C7E8885B-AA19-482A-BBF8-5897B64D00B8}" dt="2021-05-25T21:46:31.114" v="32"/>
+          <ac:grpSpMkLst>
+            <pc:docMk/>
+            <pc:sldMk cId="32408640" sldId="283"/>
+            <ac:grpSpMk id="9" creationId="{6DD38315-C869-4B6B-8E3B-B6F7F956EB5F}"/>
+          </ac:grpSpMkLst>
+        </pc:grpChg>
+        <pc:picChg chg="mod">
+          <ac:chgData name="GOYAL, PANKAJ" userId="89a7a907-3f17-47e2-a926-8cb9790a653b" providerId="ADAL" clId="{C7E8885B-AA19-482A-BBF8-5897B64D00B8}" dt="2021-05-25T21:46:31.114" v="32"/>
+          <ac:picMkLst>
+            <pc:docMk/>
+            <pc:sldMk cId="32408640" sldId="283"/>
+            <ac:picMk id="67" creationId="{1487D1C9-5B8E-4042-87DD-FE7A3ECDEA82}"/>
+          </ac:picMkLst>
+        </pc:picChg>
+        <pc:picChg chg="mod">
+          <ac:chgData name="GOYAL, PANKAJ" userId="89a7a907-3f17-47e2-a926-8cb9790a653b" providerId="ADAL" clId="{C7E8885B-AA19-482A-BBF8-5897B64D00B8}" dt="2021-05-25T21:46:31.114" v="32"/>
+          <ac:picMkLst>
+            <pc:docMk/>
+            <pc:sldMk cId="32408640" sldId="283"/>
+            <ac:picMk id="88" creationId="{00000000-0000-0000-0000-000000000000}"/>
+          </ac:picMkLst>
+        </pc:picChg>
       </pc:sldChg>
     </pc:docChg>
   </pc:docChgLst>
@@ -318,7 +454,7 @@
           <a:p>
             <a:fld id="{DD369C94-DE78-45DF-B0A8-BB9193D30FDC}" type="datetimeFigureOut">
               <a:rPr lang="en-US" smtClean="0"/>
-              <a:t>5/11/2021</a:t>
+              <a:t>5/25/2021</a:t>
             </a:fld>
             <a:endParaRPr lang="en-US"/>
           </a:p>
@@ -516,7 +652,7 @@
           <a:p>
             <a:fld id="{DD369C94-DE78-45DF-B0A8-BB9193D30FDC}" type="datetimeFigureOut">
               <a:rPr lang="en-US" smtClean="0"/>
-              <a:t>5/11/2021</a:t>
+              <a:t>5/25/2021</a:t>
             </a:fld>
             <a:endParaRPr lang="en-US"/>
           </a:p>
@@ -724,7 +860,7 @@
           <a:p>
             <a:fld id="{DD369C94-DE78-45DF-B0A8-BB9193D30FDC}" type="datetimeFigureOut">
               <a:rPr lang="en-US" smtClean="0"/>
-              <a:t>5/11/2021</a:t>
+              <a:t>5/25/2021</a:t>
             </a:fld>
             <a:endParaRPr lang="en-US"/>
           </a:p>
@@ -922,7 +1058,7 @@
           <a:p>
             <a:fld id="{DD369C94-DE78-45DF-B0A8-BB9193D30FDC}" type="datetimeFigureOut">
               <a:rPr lang="en-US" smtClean="0"/>
-              <a:t>5/11/2021</a:t>
+              <a:t>5/25/2021</a:t>
             </a:fld>
             <a:endParaRPr lang="en-US"/>
           </a:p>
@@ -1197,7 +1333,7 @@
           <a:p>
             <a:fld id="{DD369C94-DE78-45DF-B0A8-BB9193D30FDC}" type="datetimeFigureOut">
               <a:rPr lang="en-US" smtClean="0"/>
-              <a:t>5/11/2021</a:t>
+              <a:t>5/25/2021</a:t>
             </a:fld>
             <a:endParaRPr lang="en-US"/>
           </a:p>
@@ -1462,7 +1598,7 @@
           <a:p>
             <a:fld id="{DD369C94-DE78-45DF-B0A8-BB9193D30FDC}" type="datetimeFigureOut">
               <a:rPr lang="en-US" smtClean="0"/>
-              <a:t>5/11/2021</a:t>
+              <a:t>5/25/2021</a:t>
             </a:fld>
             <a:endParaRPr lang="en-US"/>
           </a:p>
@@ -1874,7 +2010,7 @@
           <a:p>
             <a:fld id="{DD369C94-DE78-45DF-B0A8-BB9193D30FDC}" type="datetimeFigureOut">
               <a:rPr lang="en-US" smtClean="0"/>
-              <a:t>5/11/2021</a:t>
+              <a:t>5/25/2021</a:t>
             </a:fld>
             <a:endParaRPr lang="en-US"/>
           </a:p>
@@ -2015,7 +2151,7 @@
           <a:p>
             <a:fld id="{DD369C94-DE78-45DF-B0A8-BB9193D30FDC}" type="datetimeFigureOut">
               <a:rPr lang="en-US" smtClean="0"/>
-              <a:t>5/11/2021</a:t>
+              <a:t>5/25/2021</a:t>
             </a:fld>
             <a:endParaRPr lang="en-US"/>
           </a:p>
@@ -2128,7 +2264,7 @@
           <a:p>
             <a:fld id="{DD369C94-DE78-45DF-B0A8-BB9193D30FDC}" type="datetimeFigureOut">
               <a:rPr lang="en-US" smtClean="0"/>
-              <a:t>5/11/2021</a:t>
+              <a:t>5/25/2021</a:t>
             </a:fld>
             <a:endParaRPr lang="en-US"/>
           </a:p>
@@ -2439,7 +2575,7 @@
           <a:p>
             <a:fld id="{DD369C94-DE78-45DF-B0A8-BB9193D30FDC}" type="datetimeFigureOut">
               <a:rPr lang="en-US" smtClean="0"/>
-              <a:t>5/11/2021</a:t>
+              <a:t>5/25/2021</a:t>
             </a:fld>
             <a:endParaRPr lang="en-US"/>
           </a:p>
@@ -2727,7 +2863,7 @@
           <a:p>
             <a:fld id="{DD369C94-DE78-45DF-B0A8-BB9193D30FDC}" type="datetimeFigureOut">
               <a:rPr lang="en-US" smtClean="0"/>
-              <a:t>5/11/2021</a:t>
+              <a:t>5/25/2021</a:t>
             </a:fld>
             <a:endParaRPr lang="en-US"/>
           </a:p>
@@ -2968,7 +3104,7 @@
           <a:p>
             <a:fld id="{DD369C94-DE78-45DF-B0A8-BB9193D30FDC}" type="datetimeFigureOut">
               <a:rPr lang="en-US" smtClean="0"/>
-              <a:t>5/11/2021</a:t>
+              <a:t>5/25/2021</a:t>
             </a:fld>
             <a:endParaRPr lang="en-US"/>
           </a:p>
@@ -3872,8 +4008,12 @@
             <a:p>
               <a:pPr algn="ctr"/>
               <a:r>
+                <a:rPr lang="en-US"/>
+                <a:t>Non-predictable </a:t>
+              </a:r>
+              <a:r>
                 <a:rPr lang="en-US" dirty="0"/>
-                <a:t>Indeterminate Performance</a:t>
+                <a:t>Performance</a:t>
               </a:r>
             </a:p>
           </p:txBody>

</xml_diff>